<commit_message>
Applying Additional Styles & Importing Google Fonts
</commit_message>
<xml_diff>
--- a/PPT/Css-v2.pptx
+++ b/PPT/Css-v2.pptx
@@ -5,7 +5,7 @@
     <p:sldMasterId id="2147483660" r:id="rId1"/>
   </p:sldMasterIdLst>
   <p:notesMasterIdLst>
-    <p:notesMasterId r:id="rId15"/>
+    <p:notesMasterId r:id="rId17"/>
   </p:notesMasterIdLst>
   <p:sldIdLst>
     <p:sldId id="256" r:id="rId2"/>
@@ -20,7 +20,9 @@
     <p:sldId id="372" r:id="rId11"/>
     <p:sldId id="373" r:id="rId12"/>
     <p:sldId id="374" r:id="rId13"/>
-    <p:sldId id="268" r:id="rId14"/>
+    <p:sldId id="375" r:id="rId14"/>
+    <p:sldId id="376" r:id="rId15"/>
+    <p:sldId id="268" r:id="rId16"/>
   </p:sldIdLst>
   <p:sldSz cx="12192000" cy="6858000"/>
   <p:notesSz cx="6858000" cy="9144000"/>
@@ -6961,6 +6963,396 @@
       </p:grpSpPr>
       <p:sp>
         <p:nvSpPr>
+          <p:cNvPr id="2" name="Title 1"/>
+          <p:cNvSpPr>
+            <a:spLocks noGrp="1"/>
+          </p:cNvSpPr>
+          <p:nvPr>
+            <p:ph type="title"/>
+          </p:nvPr>
+        </p:nvSpPr>
+        <p:spPr>
+          <a:xfrm>
+            <a:off x="210065" y="275967"/>
+            <a:ext cx="9063937" cy="737286"/>
+          </a:xfrm>
+        </p:spPr>
+        <p:txBody>
+          <a:bodyPr>
+            <a:normAutofit/>
+          </a:bodyPr>
+          <a:lstStyle/>
+          <a:p>
+            <a:r>
+              <a:rPr lang="en-IN" sz="2800" dirty="0"/>
+              <a:t>Applying Additional Styles &amp; Importing Google Fonts</a:t>
+            </a:r>
+            <a:endParaRPr lang="en-GB" sz="2800" dirty="0"/>
+          </a:p>
+        </p:txBody>
+      </p:sp>
+      <p:sp>
+        <p:nvSpPr>
+          <p:cNvPr id="3" name="Content Placeholder 2"/>
+          <p:cNvSpPr>
+            <a:spLocks noGrp="1"/>
+          </p:cNvSpPr>
+          <p:nvPr>
+            <p:ph idx="1"/>
+          </p:nvPr>
+        </p:nvSpPr>
+        <p:spPr>
+          <a:xfrm>
+            <a:off x="677334" y="1013253"/>
+            <a:ext cx="8596668" cy="5634682"/>
+          </a:xfrm>
+        </p:spPr>
+        <p:txBody>
+          <a:bodyPr>
+            <a:normAutofit/>
+          </a:bodyPr>
+          <a:lstStyle/>
+          <a:p>
+            <a:r>
+              <a:rPr lang="en-IN" dirty="0" smtClean="0"/>
+              <a:t>Lets focus on two things now:</a:t>
+            </a:r>
+          </a:p>
+          <a:p>
+            <a:pPr lvl="1"/>
+            <a:r>
+              <a:rPr lang="en-IN" dirty="0" smtClean="0"/>
+              <a:t>Adding additional styles like position , font etc.</a:t>
+            </a:r>
+          </a:p>
+          <a:p>
+            <a:pPr lvl="1"/>
+            <a:r>
+              <a:rPr lang="en-IN" dirty="0" smtClean="0"/>
+              <a:t>Adding different styles to different sections</a:t>
+            </a:r>
+          </a:p>
+          <a:p>
+            <a:r>
+              <a:rPr lang="en-IN" dirty="0" smtClean="0"/>
+              <a:t>Lets change the font family and the </a:t>
+            </a:r>
+            <a:r>
+              <a:rPr lang="en-IN" dirty="0" err="1" smtClean="0"/>
+              <a:t>color</a:t>
+            </a:r>
+            <a:r>
+              <a:rPr lang="en-IN" dirty="0" smtClean="0"/>
+              <a:t> of the h1 tag inside our first section</a:t>
+            </a:r>
+          </a:p>
+          <a:p>
+            <a:pPr lvl="1"/>
+            <a:r>
+              <a:rPr lang="en-IN" dirty="0" smtClean="0"/>
+              <a:t>Now to do that we add a selector for h1 to our main.css</a:t>
+            </a:r>
+          </a:p>
+          <a:p>
+            <a:pPr lvl="1"/>
+            <a:r>
+              <a:rPr lang="en-IN" dirty="0" smtClean="0"/>
+              <a:t>Inside the curly braces lets add </a:t>
+            </a:r>
+            <a:r>
+              <a:rPr lang="en-IN" dirty="0" err="1" smtClean="0"/>
+              <a:t>color</a:t>
+            </a:r>
+            <a:r>
+              <a:rPr lang="en-IN" dirty="0" smtClean="0"/>
+              <a:t> to the text using </a:t>
+            </a:r>
+            <a:r>
+              <a:rPr lang="en-IN" dirty="0" err="1" smtClean="0"/>
+              <a:t>color</a:t>
+            </a:r>
+            <a:r>
+              <a:rPr lang="en-IN" dirty="0" smtClean="0"/>
+              <a:t> property add the </a:t>
+            </a:r>
+            <a:r>
+              <a:rPr lang="en-IN" dirty="0" err="1" smtClean="0"/>
+              <a:t>color</a:t>
+            </a:r>
+            <a:r>
+              <a:rPr lang="en-IN" dirty="0" smtClean="0"/>
+              <a:t> property and give it a value of </a:t>
+            </a:r>
+            <a:r>
+              <a:rPr lang="en-IN" dirty="0" err="1" smtClean="0"/>
+              <a:t>white.Now</a:t>
+            </a:r>
+            <a:r>
+              <a:rPr lang="en-IN" dirty="0" smtClean="0"/>
+              <a:t> if we save it we will notice the </a:t>
+            </a:r>
+            <a:r>
+              <a:rPr lang="en-IN" dirty="0" err="1" smtClean="0"/>
+              <a:t>color</a:t>
+            </a:r>
+            <a:r>
+              <a:rPr lang="en-IN" dirty="0" smtClean="0"/>
+              <a:t> of both h1 tags in both sections changed to white</a:t>
+            </a:r>
+          </a:p>
+          <a:p>
+            <a:pPr lvl="1"/>
+            <a:r>
+              <a:rPr lang="en-IN" dirty="0" smtClean="0"/>
+              <a:t>Lets change the font to do this we add a property font-family now we have a couple of different options for the value if we set it to sans-serif it uses the default font of our browser which can be changed from preferences&gt;customised fonts</a:t>
+            </a:r>
+          </a:p>
+          <a:p>
+            <a:pPr lvl="1"/>
+            <a:r>
+              <a:rPr lang="en-IN" dirty="0" smtClean="0"/>
+              <a:t>We will notice we have a standard font ,serif font ,sans-serif font and </a:t>
+            </a:r>
+            <a:r>
+              <a:rPr lang="en-IN" dirty="0" err="1" smtClean="0"/>
+              <a:t>fized</a:t>
+            </a:r>
+            <a:r>
+              <a:rPr lang="en-IN" dirty="0" smtClean="0"/>
+              <a:t> width </a:t>
+            </a:r>
+            <a:r>
+              <a:rPr lang="en-IN" dirty="0" err="1" smtClean="0"/>
+              <a:t>font.To</a:t>
+            </a:r>
+            <a:r>
+              <a:rPr lang="en-IN" dirty="0" smtClean="0"/>
+              <a:t> use standard font just don’t set any font in </a:t>
+            </a:r>
+            <a:r>
+              <a:rPr lang="en-IN" dirty="0" err="1" smtClean="0"/>
+              <a:t>css</a:t>
+            </a:r>
+            <a:r>
+              <a:rPr lang="en-IN" dirty="0" smtClean="0"/>
+              <a:t>, to use serif font set font-family to serif to use sans-serif set it to sans-serif to use fixed with set it to </a:t>
+            </a:r>
+            <a:r>
+              <a:rPr lang="en-IN" dirty="0" err="1" smtClean="0"/>
+              <a:t>monospace.This</a:t>
+            </a:r>
+            <a:r>
+              <a:rPr lang="en-IN" dirty="0" smtClean="0"/>
+              <a:t> is a great way to set font as we will be using fonts set by browser and thus are sure of there availability</a:t>
+            </a:r>
+          </a:p>
+          <a:p>
+            <a:pPr lvl="1"/>
+            <a:r>
+              <a:rPr lang="en-IN" dirty="0" smtClean="0"/>
+              <a:t>We can also set a custom font but we are not sure if it will be installed on the browser of our users</a:t>
+            </a:r>
+            <a:endParaRPr lang="en-IN" dirty="0" smtClean="0"/>
+          </a:p>
+          <a:p>
+            <a:pPr lvl="1"/>
+            <a:endParaRPr lang="en-GB" dirty="0"/>
+          </a:p>
+        </p:txBody>
+      </p:sp>
+    </p:spTree>
+    <p:extLst>
+      <p:ext uri="{BB962C8B-B14F-4D97-AF65-F5344CB8AC3E}">
+        <p14:creationId xmlns:p14="http://schemas.microsoft.com/office/powerpoint/2010/main" val="2910457415"/>
+      </p:ext>
+    </p:extLst>
+  </p:cSld>
+  <p:clrMapOvr>
+    <a:masterClrMapping/>
+  </p:clrMapOvr>
+</p:sld>
+</file>
+
+<file path=ppt/slides/slide14.xml><?xml version="1.0" encoding="utf-8"?>
+<p:sld xmlns:a="http://schemas.openxmlformats.org/drawingml/2006/main" xmlns:r="http://schemas.openxmlformats.org/officeDocument/2006/relationships" xmlns:p="http://schemas.openxmlformats.org/presentationml/2006/main">
+  <p:cSld>
+    <p:spTree>
+      <p:nvGrpSpPr>
+        <p:cNvPr id="1" name=""/>
+        <p:cNvGrpSpPr/>
+        <p:nvPr/>
+      </p:nvGrpSpPr>
+      <p:grpSpPr>
+        <a:xfrm>
+          <a:off x="0" y="0"/>
+          <a:ext cx="0" cy="0"/>
+          <a:chOff x="0" y="0"/>
+          <a:chExt cx="0" cy="0"/>
+        </a:xfrm>
+      </p:grpSpPr>
+      <p:sp>
+        <p:nvSpPr>
+          <p:cNvPr id="2" name="Title 1"/>
+          <p:cNvSpPr>
+            <a:spLocks noGrp="1"/>
+          </p:cNvSpPr>
+          <p:nvPr>
+            <p:ph type="title"/>
+          </p:nvPr>
+        </p:nvSpPr>
+        <p:spPr>
+          <a:xfrm>
+            <a:off x="210065" y="275967"/>
+            <a:ext cx="9063937" cy="737286"/>
+          </a:xfrm>
+        </p:spPr>
+        <p:txBody>
+          <a:bodyPr>
+            <a:normAutofit/>
+          </a:bodyPr>
+          <a:lstStyle/>
+          <a:p>
+            <a:r>
+              <a:rPr lang="en-IN" sz="2800" dirty="0"/>
+              <a:t>Applying Additional Styles &amp; Importing Google Fonts</a:t>
+            </a:r>
+            <a:endParaRPr lang="en-GB" sz="2800" dirty="0"/>
+          </a:p>
+        </p:txBody>
+      </p:sp>
+      <p:sp>
+        <p:nvSpPr>
+          <p:cNvPr id="3" name="Content Placeholder 2"/>
+          <p:cNvSpPr>
+            <a:spLocks noGrp="1"/>
+          </p:cNvSpPr>
+          <p:nvPr>
+            <p:ph idx="1"/>
+          </p:nvPr>
+        </p:nvSpPr>
+        <p:spPr>
+          <a:xfrm>
+            <a:off x="677334" y="1013253"/>
+            <a:ext cx="8596668" cy="5634682"/>
+          </a:xfrm>
+        </p:spPr>
+        <p:txBody>
+          <a:bodyPr>
+            <a:normAutofit/>
+          </a:bodyPr>
+          <a:lstStyle/>
+          <a:p>
+            <a:r>
+              <a:rPr lang="en-IN" dirty="0" smtClean="0"/>
+              <a:t>If we want to use a font not installed on our pc we can use google fonts search for google fonts and we will see a bunch of fonts that we can include and use</a:t>
+            </a:r>
+          </a:p>
+          <a:p>
+            <a:r>
+              <a:rPr lang="en-IN" dirty="0" smtClean="0"/>
+              <a:t>To add any such font to our project we click on plus sign on that font which would open a popup and gives us an import link that we need to add to our html file and also gives us instructions on how to add it to our </a:t>
+            </a:r>
+            <a:r>
+              <a:rPr lang="en-IN" dirty="0" err="1" smtClean="0"/>
+              <a:t>css</a:t>
+            </a:r>
+            <a:r>
+              <a:rPr lang="en-IN" dirty="0" smtClean="0"/>
+              <a:t> .</a:t>
+            </a:r>
+          </a:p>
+          <a:p>
+            <a:r>
+              <a:rPr lang="en-IN" dirty="0" smtClean="0"/>
+              <a:t>Lets try and add </a:t>
+            </a:r>
+            <a:r>
+              <a:rPr lang="en-IN" dirty="0" err="1" smtClean="0"/>
+              <a:t>anton</a:t>
+            </a:r>
+            <a:r>
+              <a:rPr lang="en-IN" dirty="0" smtClean="0"/>
+              <a:t> font to our project for h1 tags</a:t>
+            </a:r>
+          </a:p>
+          <a:p>
+            <a:r>
+              <a:rPr lang="en-IN" dirty="0" smtClean="0"/>
+              <a:t>Copy the import link and add it to head section in our index.html above the link for our </a:t>
+            </a:r>
+            <a:r>
+              <a:rPr lang="en-IN" dirty="0" err="1" smtClean="0"/>
+              <a:t>css</a:t>
+            </a:r>
+            <a:r>
+              <a:rPr lang="en-IN" dirty="0" smtClean="0"/>
+              <a:t> file so we can use it in our </a:t>
+            </a:r>
+            <a:r>
+              <a:rPr lang="en-IN" dirty="0" err="1" smtClean="0"/>
+              <a:t>css</a:t>
+            </a:r>
+            <a:r>
+              <a:rPr lang="en-IN" dirty="0" smtClean="0"/>
+              <a:t> file</a:t>
+            </a:r>
+          </a:p>
+          <a:p>
+            <a:r>
+              <a:rPr lang="en-IN" dirty="0" smtClean="0"/>
+              <a:t>Also copy the value for the font family and paste it as a value for font-family property in our h1 selector in main.css file</a:t>
+            </a:r>
+          </a:p>
+          <a:p>
+            <a:r>
+              <a:rPr lang="en-IN" dirty="0" smtClean="0"/>
+              <a:t>Since we are dynamically loading that font we are sure that it will be available for all users on all machines</a:t>
+            </a:r>
+          </a:p>
+          <a:p>
+            <a:endParaRPr lang="en-IN" dirty="0" smtClean="0"/>
+          </a:p>
+          <a:p>
+            <a:endParaRPr lang="en-IN" dirty="0" smtClean="0"/>
+          </a:p>
+          <a:p>
+            <a:pPr lvl="1"/>
+            <a:endParaRPr lang="en-GB" dirty="0"/>
+          </a:p>
+        </p:txBody>
+      </p:sp>
+    </p:spTree>
+    <p:extLst>
+      <p:ext uri="{BB962C8B-B14F-4D97-AF65-F5344CB8AC3E}">
+        <p14:creationId xmlns:p14="http://schemas.microsoft.com/office/powerpoint/2010/main" val="367480895"/>
+      </p:ext>
+    </p:extLst>
+  </p:cSld>
+  <p:clrMapOvr>
+    <a:masterClrMapping/>
+  </p:clrMapOvr>
+</p:sld>
+</file>
+
+<file path=ppt/slides/slide15.xml><?xml version="1.0" encoding="utf-8"?>
+<p:sld xmlns:a="http://schemas.openxmlformats.org/drawingml/2006/main" xmlns:r="http://schemas.openxmlformats.org/officeDocument/2006/relationships" xmlns:p="http://schemas.openxmlformats.org/presentationml/2006/main">
+  <p:cSld>
+    <p:spTree>
+      <p:nvGrpSpPr>
+        <p:cNvPr id="1" name=""/>
+        <p:cNvGrpSpPr/>
+        <p:nvPr/>
+      </p:nvGrpSpPr>
+      <p:grpSpPr>
+        <a:xfrm>
+          <a:off x="0" y="0"/>
+          <a:ext cx="0" cy="0"/>
+          <a:chOff x="0" y="0"/>
+          <a:chExt cx="0" cy="0"/>
+        </a:xfrm>
+      </p:grpSpPr>
+      <p:sp>
+        <p:nvSpPr>
           <p:cNvPr id="3" name="Content Placeholder 2"/>
           <p:cNvSpPr>
             <a:spLocks noGrp="1"/>

</xml_diff>

<commit_message>
Assignemnt solution and Basics Complete
</commit_message>
<xml_diff>
--- a/PPT/Css-v2.pptx
+++ b/PPT/Css-v2.pptx
@@ -5,7 +5,7 @@
     <p:sldMasterId id="2147483660" r:id="rId1"/>
   </p:sldMasterIdLst>
   <p:notesMasterIdLst>
-    <p:notesMasterId r:id="rId32"/>
+    <p:notesMasterId r:id="rId33"/>
   </p:notesMasterIdLst>
   <p:sldIdLst>
     <p:sldId id="256" r:id="rId2"/>
@@ -37,7 +37,8 @@
     <p:sldId id="389" r:id="rId28"/>
     <p:sldId id="390" r:id="rId29"/>
     <p:sldId id="391" r:id="rId30"/>
-    <p:sldId id="268" r:id="rId31"/>
+    <p:sldId id="392" r:id="rId31"/>
+    <p:sldId id="268" r:id="rId32"/>
   </p:sldIdLst>
   <p:sldSz cx="12192000" cy="6858000"/>
   <p:notesSz cx="6858000" cy="9144000"/>
@@ -19568,6 +19569,173 @@
 </file>
 
 <file path=ppt/slides/slide30.xml><?xml version="1.0" encoding="utf-8"?>
+<p:sld xmlns:a="http://schemas.openxmlformats.org/drawingml/2006/main" xmlns:r="http://schemas.openxmlformats.org/officeDocument/2006/relationships" xmlns:p="http://schemas.openxmlformats.org/presentationml/2006/main">
+  <p:cSld>
+    <p:spTree>
+      <p:nvGrpSpPr>
+        <p:cNvPr id="1" name=""/>
+        <p:cNvGrpSpPr/>
+        <p:nvPr/>
+      </p:nvGrpSpPr>
+      <p:grpSpPr>
+        <a:xfrm>
+          <a:off x="0" y="0"/>
+          <a:ext cx="0" cy="0"/>
+          <a:chOff x="0" y="0"/>
+          <a:chExt cx="0" cy="0"/>
+        </a:xfrm>
+      </p:grpSpPr>
+      <p:sp>
+        <p:nvSpPr>
+          <p:cNvPr id="2" name="Title 1"/>
+          <p:cNvSpPr>
+            <a:spLocks noGrp="1"/>
+          </p:cNvSpPr>
+          <p:nvPr>
+            <p:ph type="title"/>
+          </p:nvPr>
+        </p:nvSpPr>
+        <p:spPr>
+          <a:xfrm>
+            <a:off x="677334" y="609600"/>
+            <a:ext cx="8596668" cy="645042"/>
+          </a:xfrm>
+        </p:spPr>
+        <p:txBody>
+          <a:bodyPr/>
+          <a:lstStyle/>
+          <a:p>
+            <a:r>
+              <a:rPr lang="en-IN" dirty="0" smtClean="0"/>
+              <a:t>Useful resources</a:t>
+            </a:r>
+            <a:endParaRPr lang="en-GB" dirty="0"/>
+          </a:p>
+        </p:txBody>
+      </p:sp>
+      <p:sp>
+        <p:nvSpPr>
+          <p:cNvPr id="3" name="Content Placeholder 2"/>
+          <p:cNvSpPr>
+            <a:spLocks noGrp="1"/>
+          </p:cNvSpPr>
+          <p:nvPr>
+            <p:ph idx="1"/>
+          </p:nvPr>
+        </p:nvSpPr>
+        <p:spPr>
+          <a:xfrm>
+            <a:off x="677334" y="1350335"/>
+            <a:ext cx="8596668" cy="4691027"/>
+          </a:xfrm>
+        </p:spPr>
+        <p:txBody>
+          <a:bodyPr/>
+          <a:lstStyle/>
+          <a:p>
+            <a:r>
+              <a:rPr lang="en-IN" dirty="0"/>
+              <a:t>Complete MDN CSS Reference </a:t>
+            </a:r>
+            <a:r>
+              <a:rPr lang="en-IN" dirty="0" smtClean="0"/>
+              <a:t>:</a:t>
+            </a:r>
+            <a:r>
+              <a:rPr lang="en-IN" dirty="0"/>
+              <a:t> </a:t>
+            </a:r>
+            <a:r>
+              <a:rPr lang="en-IN" dirty="0">
+                <a:hlinkClick r:id="rId2"/>
+              </a:rPr>
+              <a:t>https://developer.mozilla.org/en-US/docs/Web/CSS/Reference</a:t>
+            </a:r>
+            <a:endParaRPr lang="en-IN" dirty="0"/>
+          </a:p>
+          <a:p>
+            <a:r>
+              <a:rPr lang="en-IN" dirty="0" smtClean="0"/>
+              <a:t>Written CSS</a:t>
+            </a:r>
+            <a:r>
+              <a:rPr lang="en-IN" dirty="0"/>
+              <a:t> docs on MDN: </a:t>
+            </a:r>
+            <a:r>
+              <a:rPr lang="en-IN" dirty="0">
+                <a:hlinkClick r:id="rId3"/>
+              </a:rPr>
+              <a:t>https://developer.mozilla.org/en-US/docs/Web/CSS</a:t>
+            </a:r>
+            <a:endParaRPr lang="en-IN" dirty="0"/>
+          </a:p>
+          <a:p>
+            <a:r>
+              <a:rPr lang="en-IN" dirty="0"/>
+              <a:t>Common CSS Properties Reference: </a:t>
+            </a:r>
+            <a:r>
+              <a:rPr lang="en-IN" dirty="0">
+                <a:hlinkClick r:id="rId4"/>
+              </a:rPr>
+              <a:t>https://developer.mozilla.org/en-US/docs/Web/CSS/CSS_Properties_Reference</a:t>
+            </a:r>
+            <a:endParaRPr lang="en-IN" dirty="0"/>
+          </a:p>
+          <a:p>
+            <a:r>
+              <a:rPr lang="en-IN" dirty="0"/>
+              <a:t>CSS Combinators: </a:t>
+            </a:r>
+            <a:r>
+              <a:rPr lang="en-IN" dirty="0">
+                <a:hlinkClick r:id="rId5"/>
+              </a:rPr>
+              <a:t>https://developer.mozilla.org/en-US/docs/Learn/CSS/Introduction_to_CSS/Combinators_and_multiple_selectors</a:t>
+            </a:r>
+            <a:endParaRPr lang="en-IN" dirty="0"/>
+          </a:p>
+          <a:p>
+            <a:r>
+              <a:rPr lang="en-IN" dirty="0"/>
+              <a:t>More details on CSS </a:t>
+            </a:r>
+            <a:r>
+              <a:rPr lang="en-IN" dirty="0" err="1"/>
+              <a:t>Specifity</a:t>
+            </a:r>
+            <a:r>
+              <a:rPr lang="en-IN" dirty="0"/>
+              <a:t>: </a:t>
+            </a:r>
+            <a:r>
+              <a:rPr lang="en-IN" dirty="0">
+                <a:hlinkClick r:id="rId6"/>
+              </a:rPr>
+              <a:t>https://developer.mozilla.org/en-US/docs/Web/CSS/Specificity</a:t>
+            </a:r>
+            <a:endParaRPr lang="en-IN" dirty="0"/>
+          </a:p>
+          <a:p>
+            <a:endParaRPr lang="en-GB" dirty="0"/>
+          </a:p>
+        </p:txBody>
+      </p:sp>
+    </p:spTree>
+    <p:extLst>
+      <p:ext uri="{BB962C8B-B14F-4D97-AF65-F5344CB8AC3E}">
+        <p14:creationId xmlns:p14="http://schemas.microsoft.com/office/powerpoint/2010/main" val="205079881"/>
+      </p:ext>
+    </p:extLst>
+  </p:cSld>
+  <p:clrMapOvr>
+    <a:masterClrMapping/>
+  </p:clrMapOvr>
+</p:sld>
+</file>
+
+<file path=ppt/slides/slide31.xml><?xml version="1.0" encoding="utf-8"?>
 <p:sld xmlns:a="http://schemas.openxmlformats.org/drawingml/2006/main" xmlns:r="http://schemas.openxmlformats.org/officeDocument/2006/relationships" xmlns:p="http://schemas.openxmlformats.org/presentationml/2006/main" showMasterSp="0">
   <p:cSld>
     <p:spTree>

</xml_diff>